<commit_message>
plotting roc for rho
</commit_message>
<xml_diff>
--- a/Manuscript/Figures/makingfigureslikeabeast.pptx
+++ b/Manuscript/Figures/makingfigureslikeabeast.pptx
@@ -6,7 +6,9 @@
   </p:sldMasterIdLst>
   <p:sldIdLst>
     <p:sldId id="256" r:id="rId2"/>
-    <p:sldId id="258" r:id="rId3"/>
+    <p:sldId id="259" r:id="rId3"/>
+    <p:sldId id="260" r:id="rId4"/>
+    <p:sldId id="258" r:id="rId5"/>
   </p:sldIdLst>
   <p:sldSz cx="9144000" cy="6858000" type="screen4x3"/>
   <p:notesSz cx="6858000" cy="9144000"/>
@@ -289,7 +291,7 @@
           <a:p>
             <a:fld id="{E4085029-78DC-B543-A591-21C194686F0B}" type="datetimeFigureOut">
               <a:rPr lang="en-US" smtClean="0"/>
-              <a:t>11/2/13</a:t>
+              <a:t>12/10/13</a:t>
             </a:fld>
             <a:endParaRPr lang="en-US"/>
           </a:p>
@@ -459,7 +461,7 @@
           <a:p>
             <a:fld id="{E4085029-78DC-B543-A591-21C194686F0B}" type="datetimeFigureOut">
               <a:rPr lang="en-US" smtClean="0"/>
-              <a:t>11/2/13</a:t>
+              <a:t>12/10/13</a:t>
             </a:fld>
             <a:endParaRPr lang="en-US"/>
           </a:p>
@@ -639,7 +641,7 @@
           <a:p>
             <a:fld id="{E4085029-78DC-B543-A591-21C194686F0B}" type="datetimeFigureOut">
               <a:rPr lang="en-US" smtClean="0"/>
-              <a:t>11/2/13</a:t>
+              <a:t>12/10/13</a:t>
             </a:fld>
             <a:endParaRPr lang="en-US"/>
           </a:p>
@@ -809,7 +811,7 @@
           <a:p>
             <a:fld id="{E4085029-78DC-B543-A591-21C194686F0B}" type="datetimeFigureOut">
               <a:rPr lang="en-US" smtClean="0"/>
-              <a:t>11/2/13</a:t>
+              <a:t>12/10/13</a:t>
             </a:fld>
             <a:endParaRPr lang="en-US"/>
           </a:p>
@@ -1055,7 +1057,7 @@
           <a:p>
             <a:fld id="{E4085029-78DC-B543-A591-21C194686F0B}" type="datetimeFigureOut">
               <a:rPr lang="en-US" smtClean="0"/>
-              <a:t>11/2/13</a:t>
+              <a:t>12/10/13</a:t>
             </a:fld>
             <a:endParaRPr lang="en-US"/>
           </a:p>
@@ -1343,7 +1345,7 @@
           <a:p>
             <a:fld id="{E4085029-78DC-B543-A591-21C194686F0B}" type="datetimeFigureOut">
               <a:rPr lang="en-US" smtClean="0"/>
-              <a:t>11/2/13</a:t>
+              <a:t>12/10/13</a:t>
             </a:fld>
             <a:endParaRPr lang="en-US"/>
           </a:p>
@@ -1765,7 +1767,7 @@
           <a:p>
             <a:fld id="{E4085029-78DC-B543-A591-21C194686F0B}" type="datetimeFigureOut">
               <a:rPr lang="en-US" smtClean="0"/>
-              <a:t>11/2/13</a:t>
+              <a:t>12/10/13</a:t>
             </a:fld>
             <a:endParaRPr lang="en-US"/>
           </a:p>
@@ -1883,7 +1885,7 @@
           <a:p>
             <a:fld id="{E4085029-78DC-B543-A591-21C194686F0B}" type="datetimeFigureOut">
               <a:rPr lang="en-US" smtClean="0"/>
-              <a:t>11/2/13</a:t>
+              <a:t>12/10/13</a:t>
             </a:fld>
             <a:endParaRPr lang="en-US"/>
           </a:p>
@@ -1978,7 +1980,7 @@
           <a:p>
             <a:fld id="{E4085029-78DC-B543-A591-21C194686F0B}" type="datetimeFigureOut">
               <a:rPr lang="en-US" smtClean="0"/>
-              <a:t>11/2/13</a:t>
+              <a:t>12/10/13</a:t>
             </a:fld>
             <a:endParaRPr lang="en-US"/>
           </a:p>
@@ -2255,7 +2257,7 @@
           <a:p>
             <a:fld id="{E4085029-78DC-B543-A591-21C194686F0B}" type="datetimeFigureOut">
               <a:rPr lang="en-US" smtClean="0"/>
-              <a:t>11/2/13</a:t>
+              <a:t>12/10/13</a:t>
             </a:fld>
             <a:endParaRPr lang="en-US"/>
           </a:p>
@@ -2508,7 +2510,7 @@
           <a:p>
             <a:fld id="{E4085029-78DC-B543-A591-21C194686F0B}" type="datetimeFigureOut">
               <a:rPr lang="en-US" smtClean="0"/>
-              <a:t>11/2/13</a:t>
+              <a:t>12/10/13</a:t>
             </a:fld>
             <a:endParaRPr lang="en-US"/>
           </a:p>
@@ -2721,7 +2723,7 @@
           <a:p>
             <a:fld id="{E4085029-78DC-B543-A591-21C194686F0B}" type="datetimeFigureOut">
               <a:rPr lang="en-US" smtClean="0"/>
-              <a:t>11/2/13</a:t>
+              <a:t>12/10/13</a:t>
             </a:fld>
             <a:endParaRPr lang="en-US"/>
           </a:p>
@@ -3104,8 +3106,8 @@
         </p:nvSpPr>
         <p:spPr>
           <a:xfrm>
-            <a:off x="110439" y="2257108"/>
-            <a:ext cx="975623" cy="600164"/>
+            <a:off x="1058957" y="2327477"/>
+            <a:ext cx="975623" cy="430887"/>
           </a:xfrm>
           <a:prstGeom prst="rect">
             <a:avLst/>
@@ -3125,7 +3127,7 @@
           <a:p>
             <a:r>
               <a:rPr lang="en-US" sz="1100" spc="-20" dirty="0" smtClean="0"/>
-              <a:t>Simulate 100 sequences in Indelible</a:t>
+              <a:t>Simulate Sequences</a:t>
             </a:r>
             <a:endParaRPr lang="en-US" sz="1100" spc="-20" dirty="0"/>
           </a:p>
@@ -3139,7 +3141,7 @@
         </p:nvSpPr>
         <p:spPr>
           <a:xfrm>
-            <a:off x="1086062" y="2446941"/>
+            <a:off x="2034580" y="2453303"/>
             <a:ext cx="360803" cy="203105"/>
           </a:xfrm>
           <a:prstGeom prst="rightArrow">
@@ -3188,8 +3190,8 @@
         </p:nvSpPr>
         <p:spPr>
           <a:xfrm>
-            <a:off x="1446865" y="2257108"/>
-            <a:ext cx="1125282" cy="600164"/>
+            <a:off x="2395383" y="2339411"/>
+            <a:ext cx="1125282" cy="430887"/>
           </a:xfrm>
           <a:prstGeom prst="rect">
             <a:avLst/>
@@ -3209,19 +3211,7 @@
           <a:p>
             <a:r>
               <a:rPr lang="en-US" sz="1100" spc="-20" dirty="0" smtClean="0"/>
-              <a:t>Align amino acid sequences with </a:t>
-            </a:r>
-            <a:r>
-              <a:rPr lang="en-US" sz="1100" spc="-20" dirty="0" err="1" smtClean="0"/>
-              <a:t>mafft</a:t>
-            </a:r>
-            <a:r>
-              <a:rPr lang="en-US" sz="1100" spc="-20" dirty="0" smtClean="0"/>
-              <a:t> </a:t>
-            </a:r>
-            <a:r>
-              <a:rPr lang="en-US" sz="1100" spc="-20" dirty="0" err="1" smtClean="0"/>
-              <a:t>linsi</a:t>
+              <a:t>Align amino acid sequences</a:t>
             </a:r>
             <a:endParaRPr lang="en-US" sz="1100" spc="-20" dirty="0"/>
           </a:p>
@@ -3235,8 +3225,8 @@
         </p:nvSpPr>
         <p:spPr>
           <a:xfrm>
-            <a:off x="2937908" y="2249272"/>
-            <a:ext cx="1075981" cy="600164"/>
+            <a:off x="3886426" y="2331979"/>
+            <a:ext cx="1075981" cy="430887"/>
           </a:xfrm>
           <a:prstGeom prst="rect">
             <a:avLst/>
@@ -3256,7 +3246,11 @@
           <a:p>
             <a:r>
               <a:rPr lang="en-US" sz="1100" spc="-20" dirty="0" smtClean="0"/>
-              <a:t>Generate 100 bootstrapped alignments </a:t>
+              <a:t>Bootstrap </a:t>
+            </a:r>
+            <a:r>
+              <a:rPr lang="en-US" sz="1100" spc="-20" dirty="0" smtClean="0"/>
+              <a:t>alignments </a:t>
             </a:r>
             <a:endParaRPr lang="en-US" sz="1100" spc="-20" dirty="0"/>
           </a:p>
@@ -3270,7 +3264,7 @@
         </p:nvSpPr>
         <p:spPr>
           <a:xfrm>
-            <a:off x="4335437" y="2433078"/>
+            <a:off x="4335437" y="4689782"/>
             <a:ext cx="1660705" cy="230832"/>
           </a:xfrm>
           <a:prstGeom prst="rect">
@@ -3309,7 +3303,7 @@
         </p:nvSpPr>
         <p:spPr>
           <a:xfrm>
-            <a:off x="4335436" y="2848193"/>
+            <a:off x="4335436" y="5104897"/>
             <a:ext cx="1660705" cy="230832"/>
           </a:xfrm>
           <a:prstGeom prst="rect">
@@ -3344,13 +3338,13 @@
         </p:nvSpPr>
         <p:spPr>
           <a:xfrm rot="5400000">
-            <a:off x="3519450" y="-634449"/>
-            <a:ext cx="682764" cy="4718675"/>
+            <a:off x="4123976" y="-28543"/>
+            <a:ext cx="568120" cy="4143921"/>
           </a:xfrm>
           <a:prstGeom prst="leftBrace">
             <a:avLst>
               <a:gd name="adj1" fmla="val 86403"/>
-              <a:gd name="adj2" fmla="val 49717"/>
+              <a:gd name="adj2" fmla="val 49608"/>
             </a:avLst>
           </a:prstGeom>
           <a:ln w="19050" cmpd="sng">
@@ -3391,7 +3385,7 @@
         </p:nvSpPr>
         <p:spPr>
           <a:xfrm>
-            <a:off x="2572148" y="2446941"/>
+            <a:off x="3520666" y="2453303"/>
             <a:ext cx="365760" cy="203105"/>
           </a:xfrm>
           <a:prstGeom prst="rightArrow">
@@ -3442,7 +3436,7 @@
         </p:nvCxnSpPr>
         <p:spPr>
           <a:xfrm flipV="1">
-            <a:off x="4013889" y="2141692"/>
+            <a:off x="4013889" y="4398396"/>
             <a:ext cx="321548" cy="115416"/>
           </a:xfrm>
           <a:prstGeom prst="straightConnector1">
@@ -3480,7 +3474,7 @@
         </p:nvCxnSpPr>
         <p:spPr>
           <a:xfrm flipV="1">
-            <a:off x="4013889" y="2549354"/>
+            <a:off x="4013889" y="4806058"/>
             <a:ext cx="321548" cy="860"/>
           </a:xfrm>
           <a:prstGeom prst="straightConnector1">
@@ -3520,7 +3514,7 @@
         </p:nvCxnSpPr>
         <p:spPr>
           <a:xfrm>
-            <a:off x="4013889" y="2844530"/>
+            <a:off x="4013889" y="5101234"/>
             <a:ext cx="321547" cy="119079"/>
           </a:xfrm>
           <a:prstGeom prst="straightConnector1">
@@ -3552,43 +3546,13 @@
       </p:cxnSp>
       <p:sp>
         <p:nvSpPr>
-          <p:cNvPr id="61" name="TextBox 60"/>
-          <p:cNvSpPr txBox="1"/>
-          <p:nvPr/>
-        </p:nvSpPr>
-        <p:spPr>
-          <a:xfrm>
-            <a:off x="4619234" y="1792935"/>
-            <a:ext cx="1093612" cy="276999"/>
-          </a:xfrm>
-          <a:prstGeom prst="rect">
-            <a:avLst/>
-          </a:prstGeom>
-          <a:noFill/>
-        </p:spPr>
-        <p:txBody>
-          <a:bodyPr wrap="square" rtlCol="0">
-            <a:spAutoFit/>
-          </a:bodyPr>
-          <a:lstStyle/>
-          <a:p>
-            <a:r>
-              <a:rPr lang="en-US" sz="1200" spc="-20" dirty="0" smtClean="0"/>
-              <a:t>Score Residues</a:t>
-            </a:r>
-            <a:endParaRPr lang="en-US" sz="1200" spc="-20" dirty="0"/>
-          </a:p>
-        </p:txBody>
-      </p:sp>
-      <p:sp>
-        <p:nvSpPr>
           <p:cNvPr id="62" name="TextBox 61"/>
           <p:cNvSpPr txBox="1"/>
           <p:nvPr/>
         </p:nvSpPr>
         <p:spPr>
           <a:xfrm>
-            <a:off x="2813411" y="1014174"/>
+            <a:off x="3294750" y="1460607"/>
             <a:ext cx="2236729" cy="292388"/>
           </a:xfrm>
           <a:prstGeom prst="rect">
@@ -3625,7 +3589,7 @@
         </p:nvCxnSpPr>
         <p:spPr>
           <a:xfrm flipV="1">
-            <a:off x="5996141" y="2848193"/>
+            <a:off x="5996141" y="5104897"/>
             <a:ext cx="337137" cy="115416"/>
           </a:xfrm>
           <a:prstGeom prst="straightConnector1">
@@ -3665,7 +3629,7 @@
         </p:nvCxnSpPr>
         <p:spPr>
           <a:xfrm>
-            <a:off x="5996142" y="2548494"/>
+            <a:off x="5996142" y="4805198"/>
             <a:ext cx="337136" cy="9803"/>
           </a:xfrm>
           <a:prstGeom prst="straightConnector1">
@@ -3705,7 +3669,7 @@
         </p:nvCxnSpPr>
         <p:spPr>
           <a:xfrm>
-            <a:off x="5996141" y="2141692"/>
+            <a:off x="5996141" y="4398396"/>
             <a:ext cx="337137" cy="106337"/>
           </a:xfrm>
           <a:prstGeom prst="straightConnector1">
@@ -3737,52 +3701,13 @@
       </p:cxnSp>
       <p:sp>
         <p:nvSpPr>
-          <p:cNvPr id="71" name="TextBox 70"/>
-          <p:cNvSpPr txBox="1"/>
-          <p:nvPr/>
-        </p:nvSpPr>
-        <p:spPr>
-          <a:xfrm>
-            <a:off x="6333278" y="2248029"/>
-            <a:ext cx="1126193" cy="590930"/>
-          </a:xfrm>
-          <a:prstGeom prst="rect">
-            <a:avLst/>
-          </a:prstGeom>
-          <a:noFill/>
-          <a:ln>
-            <a:solidFill>
-              <a:srgbClr val="000000"/>
-            </a:solidFill>
-          </a:ln>
-        </p:spPr>
-        <p:txBody>
-          <a:bodyPr wrap="square" rtlCol="0">
-            <a:spAutoFit/>
-          </a:bodyPr>
-          <a:lstStyle/>
-          <a:p>
-            <a:r>
-              <a:rPr lang="en-US" sz="1080" spc="-20" dirty="0" smtClean="0"/>
-              <a:t>Mask residues with scores under threshold</a:t>
-            </a:r>
-            <a:r>
-              <a:rPr lang="en-US" sz="1080" spc="-20" baseline="30000" dirty="0" smtClean="0"/>
-              <a:t>1</a:t>
-            </a:r>
-            <a:endParaRPr lang="en-US" sz="1080" spc="-20" dirty="0"/>
-          </a:p>
-        </p:txBody>
-      </p:sp>
-      <p:sp>
-        <p:nvSpPr>
           <p:cNvPr id="73" name="Right Arrow 72"/>
           <p:cNvSpPr/>
           <p:nvPr/>
         </p:nvSpPr>
         <p:spPr>
           <a:xfrm>
-            <a:off x="7459471" y="2446941"/>
+            <a:off x="6404148" y="2449737"/>
             <a:ext cx="365760" cy="203105"/>
           </a:xfrm>
           <a:prstGeom prst="rightArrow">
@@ -3831,8 +3756,8 @@
         </p:nvSpPr>
         <p:spPr>
           <a:xfrm>
-            <a:off x="7825231" y="2244366"/>
-            <a:ext cx="1182244" cy="600164"/>
+            <a:off x="6769908" y="2339411"/>
+            <a:ext cx="1182244" cy="430887"/>
           </a:xfrm>
           <a:prstGeom prst="rect">
             <a:avLst/>
@@ -3852,7 +3777,11 @@
           <a:p>
             <a:r>
               <a:rPr lang="en-US" sz="1100" spc="-20" dirty="0" smtClean="0"/>
-              <a:t>Infer positive selection using FUBAR and PAML</a:t>
+              <a:t>Infer </a:t>
+            </a:r>
+            <a:r>
+              <a:rPr lang="en-US" sz="1100" spc="-20" dirty="0" smtClean="0"/>
+              <a:t>positive selection</a:t>
             </a:r>
             <a:endParaRPr lang="en-US" sz="1100" spc="-20" dirty="0"/>
           </a:p>
@@ -3866,7 +3795,7 @@
         </p:nvSpPr>
         <p:spPr>
           <a:xfrm>
-            <a:off x="4335437" y="2026276"/>
+            <a:off x="4335437" y="4282980"/>
             <a:ext cx="1660704" cy="230832"/>
           </a:xfrm>
           <a:prstGeom prst="rect">
@@ -3896,6 +3825,90 @@
               <a:rPr lang="en-US" sz="900" spc="-40" dirty="0"/>
               <a:t>)</a:t>
             </a:r>
+          </a:p>
+        </p:txBody>
+      </p:sp>
+      <p:sp>
+        <p:nvSpPr>
+          <p:cNvPr id="22" name="Right Arrow 21"/>
+          <p:cNvSpPr/>
+          <p:nvPr/>
+        </p:nvSpPr>
+        <p:spPr>
+          <a:xfrm>
+            <a:off x="4962407" y="2453303"/>
+            <a:ext cx="365760" cy="203105"/>
+          </a:xfrm>
+          <a:prstGeom prst="rightArrow">
+            <a:avLst/>
+          </a:prstGeom>
+          <a:solidFill>
+            <a:schemeClr val="bg1">
+              <a:lumMod val="85000"/>
+            </a:schemeClr>
+          </a:solidFill>
+          <a:ln w="12700" cmpd="sng">
+            <a:solidFill>
+              <a:schemeClr val="tx1"/>
+            </a:solidFill>
+          </a:ln>
+          <a:effectLst/>
+        </p:spPr>
+        <p:style>
+          <a:lnRef idx="1">
+            <a:schemeClr val="accent1"/>
+          </a:lnRef>
+          <a:fillRef idx="3">
+            <a:schemeClr val="accent1"/>
+          </a:fillRef>
+          <a:effectRef idx="2">
+            <a:schemeClr val="accent1"/>
+          </a:effectRef>
+          <a:fontRef idx="minor">
+            <a:schemeClr val="lt1"/>
+          </a:fontRef>
+        </p:style>
+        <p:txBody>
+          <a:bodyPr rtlCol="0" anchor="ctr"/>
+          <a:lstStyle/>
+          <a:p>
+            <a:pPr algn="ctr"/>
+            <a:endParaRPr lang="en-US" spc="-20"/>
+          </a:p>
+        </p:txBody>
+      </p:sp>
+      <p:sp>
+        <p:nvSpPr>
+          <p:cNvPr id="25" name="TextBox 24"/>
+          <p:cNvSpPr txBox="1"/>
+          <p:nvPr/>
+        </p:nvSpPr>
+        <p:spPr>
+          <a:xfrm>
+            <a:off x="5328167" y="2327073"/>
+            <a:ext cx="1075981" cy="430887"/>
+          </a:xfrm>
+          <a:prstGeom prst="rect">
+            <a:avLst/>
+          </a:prstGeom>
+          <a:noFill/>
+          <a:ln>
+            <a:solidFill>
+              <a:srgbClr val="000000"/>
+            </a:solidFill>
+          </a:ln>
+        </p:spPr>
+        <p:txBody>
+          <a:bodyPr wrap="square" rtlCol="0">
+            <a:spAutoFit/>
+          </a:bodyPr>
+          <a:lstStyle/>
+          <a:p>
+            <a:r>
+              <a:rPr lang="en-US" sz="1100" spc="-20" dirty="0" smtClean="0"/>
+              <a:t>Score and filter residues</a:t>
+            </a:r>
+            <a:endParaRPr lang="en-US" sz="1100" spc="-20" dirty="0"/>
           </a:p>
         </p:txBody>
       </p:sp>
@@ -3913,6 +3926,1028 @@
 </file>
 
 <file path=ppt/slides/slide2.xml><?xml version="1.0" encoding="utf-8"?>
+<p:sld xmlns:a="http://schemas.openxmlformats.org/drawingml/2006/main" xmlns:r="http://schemas.openxmlformats.org/officeDocument/2006/relationships" xmlns:p="http://schemas.openxmlformats.org/presentationml/2006/main">
+  <p:cSld>
+    <p:spTree>
+      <p:nvGrpSpPr>
+        <p:cNvPr id="1" name=""/>
+        <p:cNvGrpSpPr/>
+        <p:nvPr/>
+      </p:nvGrpSpPr>
+      <p:grpSpPr>
+        <a:xfrm>
+          <a:off x="0" y="0"/>
+          <a:ext cx="0" cy="0"/>
+          <a:chOff x="0" y="0"/>
+          <a:chExt cx="0" cy="0"/>
+        </a:xfrm>
+      </p:grpSpPr>
+      <p:sp>
+        <p:nvSpPr>
+          <p:cNvPr id="2" name="Title 1"/>
+          <p:cNvSpPr>
+            <a:spLocks noGrp="1"/>
+          </p:cNvSpPr>
+          <p:nvPr>
+            <p:ph type="title"/>
+          </p:nvPr>
+        </p:nvSpPr>
+        <p:spPr/>
+        <p:txBody>
+          <a:bodyPr/>
+          <a:lstStyle/>
+          <a:p>
+            <a:endParaRPr lang="en-US"/>
+          </a:p>
+        </p:txBody>
+      </p:sp>
+      <p:sp>
+        <p:nvSpPr>
+          <p:cNvPr id="3" name="Content Placeholder 2"/>
+          <p:cNvSpPr>
+            <a:spLocks noGrp="1"/>
+          </p:cNvSpPr>
+          <p:nvPr>
+            <p:ph idx="1"/>
+          </p:nvPr>
+        </p:nvSpPr>
+        <p:spPr/>
+        <p:txBody>
+          <a:bodyPr/>
+          <a:lstStyle/>
+          <a:p>
+            <a:endParaRPr lang="en-US"/>
+          </a:p>
+        </p:txBody>
+      </p:sp>
+    </p:spTree>
+    <p:extLst>
+      <p:ext uri="{BB962C8B-B14F-4D97-AF65-F5344CB8AC3E}">
+        <p14:creationId xmlns:p14="http://schemas.microsoft.com/office/powerpoint/2010/main" val="3826269376"/>
+      </p:ext>
+    </p:extLst>
+  </p:cSld>
+  <p:clrMapOvr>
+    <a:masterClrMapping/>
+  </p:clrMapOvr>
+</p:sld>
+</file>
+
+<file path=ppt/slides/slide3.xml><?xml version="1.0" encoding="utf-8"?>
+<p:sld xmlns:a="http://schemas.openxmlformats.org/drawingml/2006/main" xmlns:r="http://schemas.openxmlformats.org/officeDocument/2006/relationships" xmlns:p="http://schemas.openxmlformats.org/presentationml/2006/main">
+  <p:cSld>
+    <p:spTree>
+      <p:nvGrpSpPr>
+        <p:cNvPr id="1" name=""/>
+        <p:cNvGrpSpPr/>
+        <p:nvPr/>
+      </p:nvGrpSpPr>
+      <p:grpSpPr>
+        <a:xfrm>
+          <a:off x="0" y="0"/>
+          <a:ext cx="0" cy="0"/>
+          <a:chOff x="0" y="0"/>
+          <a:chExt cx="0" cy="0"/>
+        </a:xfrm>
+      </p:grpSpPr>
+      <p:sp>
+        <p:nvSpPr>
+          <p:cNvPr id="9" name="TextBox 8"/>
+          <p:cNvSpPr txBox="1"/>
+          <p:nvPr/>
+        </p:nvSpPr>
+        <p:spPr>
+          <a:xfrm>
+            <a:off x="63306" y="2680563"/>
+            <a:ext cx="1336426" cy="261610"/>
+          </a:xfrm>
+          <a:prstGeom prst="rect">
+            <a:avLst/>
+          </a:prstGeom>
+          <a:noFill/>
+          <a:ln>
+            <a:solidFill>
+              <a:srgbClr val="000000"/>
+            </a:solidFill>
+          </a:ln>
+        </p:spPr>
+        <p:txBody>
+          <a:bodyPr wrap="square" rtlCol="0">
+            <a:spAutoFit/>
+          </a:bodyPr>
+          <a:lstStyle/>
+          <a:p>
+            <a:r>
+              <a:rPr lang="en-US" sz="1100" spc="-20" dirty="0" smtClean="0"/>
+              <a:t>Simulate sequences</a:t>
+            </a:r>
+            <a:endParaRPr lang="en-US" sz="1100" spc="-20" dirty="0"/>
+          </a:p>
+        </p:txBody>
+      </p:sp>
+      <p:sp>
+        <p:nvSpPr>
+          <p:cNvPr id="10" name="Right Arrow 9"/>
+          <p:cNvSpPr/>
+          <p:nvPr/>
+        </p:nvSpPr>
+        <p:spPr>
+          <a:xfrm>
+            <a:off x="1399732" y="2693368"/>
+            <a:ext cx="360803" cy="203105"/>
+          </a:xfrm>
+          <a:prstGeom prst="rightArrow">
+            <a:avLst/>
+          </a:prstGeom>
+          <a:solidFill>
+            <a:schemeClr val="bg1">
+              <a:lumMod val="85000"/>
+            </a:schemeClr>
+          </a:solidFill>
+          <a:ln w="12700" cmpd="sng">
+            <a:solidFill>
+              <a:schemeClr val="tx1"/>
+            </a:solidFill>
+          </a:ln>
+          <a:effectLst/>
+        </p:spPr>
+        <p:style>
+          <a:lnRef idx="1">
+            <a:schemeClr val="accent1"/>
+          </a:lnRef>
+          <a:fillRef idx="3">
+            <a:schemeClr val="accent1"/>
+          </a:fillRef>
+          <a:effectRef idx="2">
+            <a:schemeClr val="accent1"/>
+          </a:effectRef>
+          <a:fontRef idx="minor">
+            <a:schemeClr val="lt1"/>
+          </a:fontRef>
+        </p:style>
+        <p:txBody>
+          <a:bodyPr rtlCol="0" anchor="ctr"/>
+          <a:lstStyle/>
+          <a:p>
+            <a:pPr algn="ctr"/>
+            <a:endParaRPr lang="en-US" spc="-20"/>
+          </a:p>
+        </p:txBody>
+      </p:sp>
+      <p:sp>
+        <p:nvSpPr>
+          <p:cNvPr id="11" name="TextBox 10"/>
+          <p:cNvSpPr txBox="1"/>
+          <p:nvPr/>
+        </p:nvSpPr>
+        <p:spPr>
+          <a:xfrm>
+            <a:off x="1760535" y="2680159"/>
+            <a:ext cx="1125282" cy="261610"/>
+          </a:xfrm>
+          <a:prstGeom prst="rect">
+            <a:avLst/>
+          </a:prstGeom>
+          <a:noFill/>
+          <a:ln>
+            <a:solidFill>
+              <a:srgbClr val="000000"/>
+            </a:solidFill>
+          </a:ln>
+        </p:spPr>
+        <p:txBody>
+          <a:bodyPr wrap="square" rtlCol="0">
+            <a:spAutoFit/>
+          </a:bodyPr>
+          <a:lstStyle/>
+          <a:p>
+            <a:r>
+              <a:rPr lang="en-US" sz="1100" spc="-20" dirty="0" smtClean="0"/>
+              <a:t>Align sequences</a:t>
+            </a:r>
+            <a:endParaRPr lang="en-US" sz="1100" spc="-20" dirty="0"/>
+          </a:p>
+        </p:txBody>
+      </p:sp>
+      <p:sp>
+        <p:nvSpPr>
+          <p:cNvPr id="14" name="TextBox 13"/>
+          <p:cNvSpPr txBox="1"/>
+          <p:nvPr/>
+        </p:nvSpPr>
+        <p:spPr>
+          <a:xfrm>
+            <a:off x="3258821" y="2680159"/>
+            <a:ext cx="1360414" cy="261610"/>
+          </a:xfrm>
+          <a:prstGeom prst="rect">
+            <a:avLst/>
+          </a:prstGeom>
+          <a:noFill/>
+          <a:ln>
+            <a:solidFill>
+              <a:srgbClr val="000000"/>
+            </a:solidFill>
+          </a:ln>
+        </p:spPr>
+        <p:txBody>
+          <a:bodyPr wrap="square" rtlCol="0">
+            <a:spAutoFit/>
+          </a:bodyPr>
+          <a:lstStyle/>
+          <a:p>
+            <a:r>
+              <a:rPr lang="en-US" sz="1100" spc="-20" dirty="0" smtClean="0"/>
+              <a:t>Bootstrap alignment</a:t>
+            </a:r>
+            <a:endParaRPr lang="en-US" sz="1100" spc="-20" dirty="0"/>
+          </a:p>
+        </p:txBody>
+      </p:sp>
+      <p:sp>
+        <p:nvSpPr>
+          <p:cNvPr id="23" name="TextBox 22"/>
+          <p:cNvSpPr txBox="1"/>
+          <p:nvPr/>
+        </p:nvSpPr>
+        <p:spPr>
+          <a:xfrm>
+            <a:off x="4335438" y="4593236"/>
+            <a:ext cx="1660705" cy="230832"/>
+          </a:xfrm>
+          <a:prstGeom prst="rect">
+            <a:avLst/>
+          </a:prstGeom>
+          <a:noFill/>
+          <a:ln>
+            <a:solidFill>
+              <a:srgbClr val="000000"/>
+            </a:solidFill>
+          </a:ln>
+        </p:spPr>
+        <p:txBody>
+          <a:bodyPr wrap="square" rtlCol="0">
+            <a:spAutoFit/>
+          </a:bodyPr>
+          <a:lstStyle/>
+          <a:p>
+            <a:r>
+              <a:rPr lang="en-US" sz="900" spc="-20" dirty="0" smtClean="0"/>
+              <a:t>Weighted with </a:t>
+            </a:r>
+            <a:r>
+              <a:rPr lang="en-US" sz="900" spc="-20" dirty="0" err="1" smtClean="0"/>
+              <a:t>BranchManager</a:t>
+            </a:r>
+            <a:endParaRPr lang="en-US" sz="900" spc="-20" dirty="0"/>
+          </a:p>
+        </p:txBody>
+      </p:sp>
+      <p:sp>
+        <p:nvSpPr>
+          <p:cNvPr id="24" name="TextBox 23"/>
+          <p:cNvSpPr txBox="1"/>
+          <p:nvPr/>
+        </p:nvSpPr>
+        <p:spPr>
+          <a:xfrm>
+            <a:off x="4335437" y="5008351"/>
+            <a:ext cx="1660705" cy="230832"/>
+          </a:xfrm>
+          <a:prstGeom prst="rect">
+            <a:avLst/>
+          </a:prstGeom>
+          <a:noFill/>
+          <a:ln>
+            <a:solidFill>
+              <a:srgbClr val="000000"/>
+            </a:solidFill>
+          </a:ln>
+        </p:spPr>
+        <p:txBody>
+          <a:bodyPr wrap="square" rtlCol="0">
+            <a:spAutoFit/>
+          </a:bodyPr>
+          <a:lstStyle/>
+          <a:p>
+            <a:r>
+              <a:rPr lang="en-US" sz="900" spc="-20" dirty="0" smtClean="0"/>
+              <a:t>Weighted by patristic distance</a:t>
+            </a:r>
+            <a:endParaRPr lang="en-US" sz="900" spc="-20" dirty="0"/>
+          </a:p>
+        </p:txBody>
+      </p:sp>
+      <p:sp>
+        <p:nvSpPr>
+          <p:cNvPr id="27" name="Left Brace 26"/>
+          <p:cNvSpPr/>
+          <p:nvPr/>
+        </p:nvSpPr>
+        <p:spPr>
+          <a:xfrm rot="5400000">
+            <a:off x="3125817" y="-189688"/>
+            <a:ext cx="682764" cy="4134933"/>
+          </a:xfrm>
+          <a:prstGeom prst="leftBrace">
+            <a:avLst>
+              <a:gd name="adj1" fmla="val 86403"/>
+              <a:gd name="adj2" fmla="val 49717"/>
+            </a:avLst>
+          </a:prstGeom>
+          <a:ln w="19050" cmpd="sng">
+            <a:solidFill>
+              <a:srgbClr val="000000"/>
+            </a:solidFill>
+          </a:ln>
+          <a:effectLst/>
+        </p:spPr>
+        <p:style>
+          <a:lnRef idx="2">
+            <a:schemeClr val="accent1"/>
+          </a:lnRef>
+          <a:fillRef idx="0">
+            <a:schemeClr val="accent1"/>
+          </a:fillRef>
+          <a:effectRef idx="1">
+            <a:schemeClr val="accent1"/>
+          </a:effectRef>
+          <a:fontRef idx="minor">
+            <a:schemeClr val="tx1"/>
+          </a:fontRef>
+        </p:style>
+        <p:txBody>
+          <a:bodyPr rtlCol="0" anchor="ctr"/>
+          <a:lstStyle/>
+          <a:p>
+            <a:pPr algn="ctr"/>
+            <a:endParaRPr lang="en-US" spc="-20"/>
+          </a:p>
+        </p:txBody>
+      </p:sp>
+      <p:sp>
+        <p:nvSpPr>
+          <p:cNvPr id="40" name="Right Arrow 39"/>
+          <p:cNvSpPr/>
+          <p:nvPr/>
+        </p:nvSpPr>
+        <p:spPr>
+          <a:xfrm>
+            <a:off x="2885817" y="2694833"/>
+            <a:ext cx="365760" cy="203105"/>
+          </a:xfrm>
+          <a:prstGeom prst="rightArrow">
+            <a:avLst/>
+          </a:prstGeom>
+          <a:solidFill>
+            <a:schemeClr val="bg1">
+              <a:lumMod val="85000"/>
+            </a:schemeClr>
+          </a:solidFill>
+          <a:ln w="12700" cmpd="sng">
+            <a:solidFill>
+              <a:schemeClr val="tx1"/>
+            </a:solidFill>
+          </a:ln>
+          <a:effectLst/>
+        </p:spPr>
+        <p:style>
+          <a:lnRef idx="1">
+            <a:schemeClr val="accent1"/>
+          </a:lnRef>
+          <a:fillRef idx="3">
+            <a:schemeClr val="accent1"/>
+          </a:fillRef>
+          <a:effectRef idx="2">
+            <a:schemeClr val="accent1"/>
+          </a:effectRef>
+          <a:fontRef idx="minor">
+            <a:schemeClr val="lt1"/>
+          </a:fontRef>
+        </p:style>
+        <p:txBody>
+          <a:bodyPr rtlCol="0" anchor="ctr"/>
+          <a:lstStyle/>
+          <a:p>
+            <a:pPr algn="ctr"/>
+            <a:endParaRPr lang="en-US" spc="-20"/>
+          </a:p>
+        </p:txBody>
+      </p:sp>
+      <p:cxnSp>
+        <p:nvCxnSpPr>
+          <p:cNvPr id="44" name="Straight Arrow Connector 43"/>
+          <p:cNvCxnSpPr>
+            <a:endCxn id="76" idx="1"/>
+          </p:cNvCxnSpPr>
+          <p:nvPr/>
+        </p:nvCxnSpPr>
+        <p:spPr>
+          <a:xfrm flipV="1">
+            <a:off x="4013890" y="4301850"/>
+            <a:ext cx="321548" cy="115416"/>
+          </a:xfrm>
+          <a:prstGeom prst="straightConnector1">
+            <a:avLst/>
+          </a:prstGeom>
+          <a:ln w="12700" cmpd="sng">
+            <a:solidFill>
+              <a:srgbClr val="000000"/>
+            </a:solidFill>
+            <a:headEnd type="none"/>
+            <a:tailEnd type="triangle" w="med" len="sm"/>
+          </a:ln>
+          <a:effectLst/>
+        </p:spPr>
+        <p:style>
+          <a:lnRef idx="2">
+            <a:schemeClr val="accent1"/>
+          </a:lnRef>
+          <a:fillRef idx="0">
+            <a:schemeClr val="accent1"/>
+          </a:fillRef>
+          <a:effectRef idx="1">
+            <a:schemeClr val="accent1"/>
+          </a:effectRef>
+          <a:fontRef idx="minor">
+            <a:schemeClr val="tx1"/>
+          </a:fontRef>
+        </p:style>
+      </p:cxnSp>
+      <p:cxnSp>
+        <p:nvCxnSpPr>
+          <p:cNvPr id="48" name="Straight Arrow Connector 47"/>
+          <p:cNvCxnSpPr/>
+          <p:nvPr/>
+        </p:nvCxnSpPr>
+        <p:spPr>
+          <a:xfrm flipV="1">
+            <a:off x="4013890" y="4709512"/>
+            <a:ext cx="321548" cy="860"/>
+          </a:xfrm>
+          <a:prstGeom prst="straightConnector1">
+            <a:avLst/>
+          </a:prstGeom>
+          <a:ln w="12700" cmpd="sng">
+            <a:solidFill>
+              <a:srgbClr val="000000"/>
+            </a:solidFill>
+            <a:headEnd type="none"/>
+            <a:tailEnd type="triangle" w="med" len="sm"/>
+          </a:ln>
+          <a:effectLst/>
+        </p:spPr>
+        <p:style>
+          <a:lnRef idx="2">
+            <a:schemeClr val="accent1"/>
+          </a:lnRef>
+          <a:fillRef idx="0">
+            <a:schemeClr val="accent1"/>
+          </a:fillRef>
+          <a:effectRef idx="1">
+            <a:schemeClr val="accent1"/>
+          </a:effectRef>
+          <a:fontRef idx="minor">
+            <a:schemeClr val="tx1"/>
+          </a:fontRef>
+        </p:style>
+      </p:cxnSp>
+      <p:cxnSp>
+        <p:nvCxnSpPr>
+          <p:cNvPr id="49" name="Straight Arrow Connector 48"/>
+          <p:cNvCxnSpPr>
+            <a:endCxn id="24" idx="1"/>
+          </p:cNvCxnSpPr>
+          <p:nvPr/>
+        </p:nvCxnSpPr>
+        <p:spPr>
+          <a:xfrm>
+            <a:off x="4013890" y="5004688"/>
+            <a:ext cx="321547" cy="119079"/>
+          </a:xfrm>
+          <a:prstGeom prst="straightConnector1">
+            <a:avLst/>
+          </a:prstGeom>
+          <a:ln w="12700" cmpd="sng">
+            <a:solidFill>
+              <a:srgbClr val="000000"/>
+            </a:solidFill>
+            <a:headEnd type="none"/>
+            <a:tailEnd type="triangle" w="med" len="sm"/>
+          </a:ln>
+          <a:effectLst/>
+        </p:spPr>
+        <p:style>
+          <a:lnRef idx="2">
+            <a:schemeClr val="accent1"/>
+          </a:lnRef>
+          <a:fillRef idx="0">
+            <a:schemeClr val="accent1"/>
+          </a:fillRef>
+          <a:effectRef idx="1">
+            <a:schemeClr val="accent1"/>
+          </a:effectRef>
+          <a:fontRef idx="minor">
+            <a:schemeClr val="tx1"/>
+          </a:fontRef>
+        </p:style>
+      </p:cxnSp>
+      <p:sp>
+        <p:nvSpPr>
+          <p:cNvPr id="61" name="TextBox 60"/>
+          <p:cNvSpPr txBox="1"/>
+          <p:nvPr/>
+        </p:nvSpPr>
+        <p:spPr>
+          <a:xfrm>
+            <a:off x="4619235" y="3953093"/>
+            <a:ext cx="1093612" cy="276999"/>
+          </a:xfrm>
+          <a:prstGeom prst="rect">
+            <a:avLst/>
+          </a:prstGeom>
+          <a:noFill/>
+        </p:spPr>
+        <p:txBody>
+          <a:bodyPr wrap="square" rtlCol="0">
+            <a:spAutoFit/>
+          </a:bodyPr>
+          <a:lstStyle/>
+          <a:p>
+            <a:r>
+              <a:rPr lang="en-US" sz="1200" spc="-20" dirty="0" smtClean="0"/>
+              <a:t>Score Residues</a:t>
+            </a:r>
+            <a:endParaRPr lang="en-US" sz="1200" spc="-20" dirty="0"/>
+          </a:p>
+        </p:txBody>
+      </p:sp>
+      <p:sp>
+        <p:nvSpPr>
+          <p:cNvPr id="62" name="TextBox 61"/>
+          <p:cNvSpPr txBox="1"/>
+          <p:nvPr/>
+        </p:nvSpPr>
+        <p:spPr>
+          <a:xfrm>
+            <a:off x="2382506" y="1226222"/>
+            <a:ext cx="2236729" cy="292388"/>
+          </a:xfrm>
+          <a:prstGeom prst="rect">
+            <a:avLst/>
+          </a:prstGeom>
+          <a:noFill/>
+          <a:ln>
+            <a:solidFill>
+              <a:srgbClr val="000000"/>
+            </a:solidFill>
+          </a:ln>
+        </p:spPr>
+        <p:txBody>
+          <a:bodyPr wrap="square" rtlCol="0">
+            <a:spAutoFit/>
+          </a:bodyPr>
+          <a:lstStyle/>
+          <a:p>
+            <a:r>
+              <a:rPr lang="en-US" sz="1300" spc="-20" dirty="0" smtClean="0"/>
+              <a:t> Guidance Re-implementation</a:t>
+            </a:r>
+            <a:endParaRPr lang="en-US" sz="1300" spc="-20" dirty="0"/>
+          </a:p>
+        </p:txBody>
+      </p:sp>
+      <p:cxnSp>
+        <p:nvCxnSpPr>
+          <p:cNvPr id="67" name="Straight Arrow Connector 66"/>
+          <p:cNvCxnSpPr>
+            <a:stCxn id="24" idx="3"/>
+          </p:cNvCxnSpPr>
+          <p:nvPr/>
+        </p:nvCxnSpPr>
+        <p:spPr>
+          <a:xfrm flipV="1">
+            <a:off x="5996142" y="5008351"/>
+            <a:ext cx="337137" cy="115416"/>
+          </a:xfrm>
+          <a:prstGeom prst="straightConnector1">
+            <a:avLst/>
+          </a:prstGeom>
+          <a:ln w="12700" cmpd="sng">
+            <a:solidFill>
+              <a:srgbClr val="000000"/>
+            </a:solidFill>
+            <a:headEnd type="none"/>
+            <a:tailEnd type="triangle" w="med" len="sm"/>
+          </a:ln>
+          <a:effectLst/>
+        </p:spPr>
+        <p:style>
+          <a:lnRef idx="2">
+            <a:schemeClr val="accent1"/>
+          </a:lnRef>
+          <a:fillRef idx="0">
+            <a:schemeClr val="accent1"/>
+          </a:fillRef>
+          <a:effectRef idx="1">
+            <a:schemeClr val="accent1"/>
+          </a:effectRef>
+          <a:fontRef idx="minor">
+            <a:schemeClr val="tx1"/>
+          </a:fontRef>
+        </p:style>
+      </p:cxnSp>
+      <p:cxnSp>
+        <p:nvCxnSpPr>
+          <p:cNvPr id="68" name="Straight Arrow Connector 67"/>
+          <p:cNvCxnSpPr>
+            <a:stCxn id="23" idx="3"/>
+          </p:cNvCxnSpPr>
+          <p:nvPr/>
+        </p:nvCxnSpPr>
+        <p:spPr>
+          <a:xfrm>
+            <a:off x="5996143" y="4708652"/>
+            <a:ext cx="337136" cy="9803"/>
+          </a:xfrm>
+          <a:prstGeom prst="straightConnector1">
+            <a:avLst/>
+          </a:prstGeom>
+          <a:ln w="12700" cmpd="sng">
+            <a:solidFill>
+              <a:srgbClr val="000000"/>
+            </a:solidFill>
+            <a:headEnd type="none"/>
+            <a:tailEnd type="triangle" w="med" len="sm"/>
+          </a:ln>
+          <a:effectLst/>
+        </p:spPr>
+        <p:style>
+          <a:lnRef idx="2">
+            <a:schemeClr val="accent1"/>
+          </a:lnRef>
+          <a:fillRef idx="0">
+            <a:schemeClr val="accent1"/>
+          </a:fillRef>
+          <a:effectRef idx="1">
+            <a:schemeClr val="accent1"/>
+          </a:effectRef>
+          <a:fontRef idx="minor">
+            <a:schemeClr val="tx1"/>
+          </a:fontRef>
+        </p:style>
+      </p:cxnSp>
+      <p:cxnSp>
+        <p:nvCxnSpPr>
+          <p:cNvPr id="69" name="Straight Arrow Connector 68"/>
+          <p:cNvCxnSpPr>
+            <a:stCxn id="76" idx="3"/>
+          </p:cNvCxnSpPr>
+          <p:nvPr/>
+        </p:nvCxnSpPr>
+        <p:spPr>
+          <a:xfrm>
+            <a:off x="5996142" y="4301850"/>
+            <a:ext cx="337137" cy="106337"/>
+          </a:xfrm>
+          <a:prstGeom prst="straightConnector1">
+            <a:avLst/>
+          </a:prstGeom>
+          <a:ln w="12700" cmpd="sng">
+            <a:solidFill>
+              <a:srgbClr val="000000"/>
+            </a:solidFill>
+            <a:headEnd type="none"/>
+            <a:tailEnd type="triangle" w="med" len="sm"/>
+          </a:ln>
+          <a:effectLst/>
+        </p:spPr>
+        <p:style>
+          <a:lnRef idx="2">
+            <a:schemeClr val="accent1"/>
+          </a:lnRef>
+          <a:fillRef idx="0">
+            <a:schemeClr val="accent1"/>
+          </a:fillRef>
+          <a:effectRef idx="1">
+            <a:schemeClr val="accent1"/>
+          </a:effectRef>
+          <a:fontRef idx="minor">
+            <a:schemeClr val="tx1"/>
+          </a:fontRef>
+        </p:style>
+      </p:cxnSp>
+      <p:sp>
+        <p:nvSpPr>
+          <p:cNvPr id="71" name="TextBox 70"/>
+          <p:cNvSpPr txBox="1"/>
+          <p:nvPr/>
+        </p:nvSpPr>
+        <p:spPr>
+          <a:xfrm>
+            <a:off x="6452451" y="2682643"/>
+            <a:ext cx="1126193" cy="258532"/>
+          </a:xfrm>
+          <a:prstGeom prst="rect">
+            <a:avLst/>
+          </a:prstGeom>
+          <a:noFill/>
+          <a:ln>
+            <a:solidFill>
+              <a:srgbClr val="000000"/>
+            </a:solidFill>
+          </a:ln>
+        </p:spPr>
+        <p:txBody>
+          <a:bodyPr wrap="square" rtlCol="0">
+            <a:spAutoFit/>
+          </a:bodyPr>
+          <a:lstStyle/>
+          <a:p>
+            <a:r>
+              <a:rPr lang="en-US" sz="1080" spc="-20" dirty="0" smtClean="0"/>
+              <a:t>Filter alignment</a:t>
+            </a:r>
+            <a:endParaRPr lang="en-US" sz="1080" spc="-20" dirty="0"/>
+          </a:p>
+        </p:txBody>
+      </p:sp>
+      <p:sp>
+        <p:nvSpPr>
+          <p:cNvPr id="73" name="Right Arrow 72"/>
+          <p:cNvSpPr/>
+          <p:nvPr/>
+        </p:nvSpPr>
+        <p:spPr>
+          <a:xfrm>
+            <a:off x="7578644" y="2708996"/>
+            <a:ext cx="365760" cy="203105"/>
+          </a:xfrm>
+          <a:prstGeom prst="rightArrow">
+            <a:avLst/>
+          </a:prstGeom>
+          <a:solidFill>
+            <a:schemeClr val="bg1">
+              <a:lumMod val="85000"/>
+            </a:schemeClr>
+          </a:solidFill>
+          <a:ln w="12700" cmpd="sng">
+            <a:solidFill>
+              <a:schemeClr val="tx1"/>
+            </a:solidFill>
+          </a:ln>
+          <a:effectLst/>
+        </p:spPr>
+        <p:style>
+          <a:lnRef idx="1">
+            <a:schemeClr val="accent1"/>
+          </a:lnRef>
+          <a:fillRef idx="3">
+            <a:schemeClr val="accent1"/>
+          </a:fillRef>
+          <a:effectRef idx="2">
+            <a:schemeClr val="accent1"/>
+          </a:effectRef>
+          <a:fontRef idx="minor">
+            <a:schemeClr val="lt1"/>
+          </a:fontRef>
+        </p:style>
+        <p:txBody>
+          <a:bodyPr rtlCol="0" anchor="ctr"/>
+          <a:lstStyle/>
+          <a:p>
+            <a:pPr algn="ctr"/>
+            <a:endParaRPr lang="en-US" spc="-20"/>
+          </a:p>
+        </p:txBody>
+      </p:sp>
+      <p:sp>
+        <p:nvSpPr>
+          <p:cNvPr id="74" name="TextBox 73"/>
+          <p:cNvSpPr txBox="1"/>
+          <p:nvPr/>
+        </p:nvSpPr>
+        <p:spPr>
+          <a:xfrm>
+            <a:off x="7944404" y="2680159"/>
+            <a:ext cx="1182244" cy="430887"/>
+          </a:xfrm>
+          <a:prstGeom prst="rect">
+            <a:avLst/>
+          </a:prstGeom>
+          <a:noFill/>
+          <a:ln>
+            <a:solidFill>
+              <a:srgbClr val="000000"/>
+            </a:solidFill>
+          </a:ln>
+        </p:spPr>
+        <p:txBody>
+          <a:bodyPr wrap="square" rtlCol="0">
+            <a:spAutoFit/>
+          </a:bodyPr>
+          <a:lstStyle/>
+          <a:p>
+            <a:r>
+              <a:rPr lang="en-US" sz="1100" spc="-20" dirty="0" smtClean="0"/>
+              <a:t>Infer </a:t>
+            </a:r>
+            <a:r>
+              <a:rPr lang="en-US" sz="1100" spc="-20" dirty="0" smtClean="0"/>
+              <a:t>positive selection</a:t>
+            </a:r>
+            <a:endParaRPr lang="en-US" sz="1100" spc="-20" dirty="0"/>
+          </a:p>
+        </p:txBody>
+      </p:sp>
+      <p:sp>
+        <p:nvSpPr>
+          <p:cNvPr id="76" name="Rectangle 75"/>
+          <p:cNvSpPr/>
+          <p:nvPr/>
+        </p:nvSpPr>
+        <p:spPr>
+          <a:xfrm>
+            <a:off x="4335438" y="4186434"/>
+            <a:ext cx="1660704" cy="230832"/>
+          </a:xfrm>
+          <a:prstGeom prst="rect">
+            <a:avLst/>
+          </a:prstGeom>
+          <a:ln>
+            <a:solidFill>
+              <a:schemeClr val="tx1"/>
+            </a:solidFill>
+          </a:ln>
+        </p:spPr>
+        <p:txBody>
+          <a:bodyPr wrap="square">
+            <a:spAutoFit/>
+          </a:bodyPr>
+          <a:lstStyle/>
+          <a:p>
+            <a:r>
+              <a:rPr lang="en-US" sz="900" spc="-40" dirty="0" smtClean="0"/>
+              <a:t>Original Guidance (</a:t>
+            </a:r>
+            <a:r>
+              <a:rPr lang="en-US" sz="900" spc="-40" dirty="0" err="1" smtClean="0"/>
+              <a:t>unweighted</a:t>
+            </a:r>
+            <a:r>
+              <a:rPr lang="en-US" sz="900" spc="-40" dirty="0"/>
+              <a:t>)</a:t>
+            </a:r>
+          </a:p>
+        </p:txBody>
+      </p:sp>
+      <p:sp>
+        <p:nvSpPr>
+          <p:cNvPr id="22" name="TextBox 21"/>
+          <p:cNvSpPr txBox="1"/>
+          <p:nvPr/>
+        </p:nvSpPr>
+        <p:spPr>
+          <a:xfrm>
+            <a:off x="4982641" y="2693368"/>
+            <a:ext cx="1104050" cy="261610"/>
+          </a:xfrm>
+          <a:prstGeom prst="rect">
+            <a:avLst/>
+          </a:prstGeom>
+          <a:noFill/>
+          <a:ln>
+            <a:solidFill>
+              <a:srgbClr val="000000"/>
+            </a:solidFill>
+          </a:ln>
+        </p:spPr>
+        <p:txBody>
+          <a:bodyPr wrap="square" rtlCol="0">
+            <a:spAutoFit/>
+          </a:bodyPr>
+          <a:lstStyle/>
+          <a:p>
+            <a:r>
+              <a:rPr lang="en-US" sz="1100" spc="-20" dirty="0" smtClean="0"/>
+              <a:t>Score alignment</a:t>
+            </a:r>
+            <a:endParaRPr lang="en-US" sz="1100" spc="-20" dirty="0"/>
+          </a:p>
+        </p:txBody>
+      </p:sp>
+      <p:sp>
+        <p:nvSpPr>
+          <p:cNvPr id="25" name="Right Arrow 24"/>
+          <p:cNvSpPr/>
+          <p:nvPr/>
+        </p:nvSpPr>
+        <p:spPr>
+          <a:xfrm>
+            <a:off x="4619235" y="2724267"/>
+            <a:ext cx="365760" cy="203105"/>
+          </a:xfrm>
+          <a:prstGeom prst="rightArrow">
+            <a:avLst/>
+          </a:prstGeom>
+          <a:solidFill>
+            <a:schemeClr val="bg1">
+              <a:lumMod val="85000"/>
+            </a:schemeClr>
+          </a:solidFill>
+          <a:ln w="12700" cmpd="sng">
+            <a:solidFill>
+              <a:schemeClr val="tx1"/>
+            </a:solidFill>
+          </a:ln>
+          <a:effectLst/>
+        </p:spPr>
+        <p:style>
+          <a:lnRef idx="1">
+            <a:schemeClr val="accent1"/>
+          </a:lnRef>
+          <a:fillRef idx="3">
+            <a:schemeClr val="accent1"/>
+          </a:fillRef>
+          <a:effectRef idx="2">
+            <a:schemeClr val="accent1"/>
+          </a:effectRef>
+          <a:fontRef idx="minor">
+            <a:schemeClr val="lt1"/>
+          </a:fontRef>
+        </p:style>
+        <p:txBody>
+          <a:bodyPr rtlCol="0" anchor="ctr"/>
+          <a:lstStyle/>
+          <a:p>
+            <a:pPr algn="ctr"/>
+            <a:endParaRPr lang="en-US" spc="-20"/>
+          </a:p>
+        </p:txBody>
+      </p:sp>
+      <p:sp>
+        <p:nvSpPr>
+          <p:cNvPr id="26" name="Right Arrow 25"/>
+          <p:cNvSpPr/>
+          <p:nvPr/>
+        </p:nvSpPr>
+        <p:spPr>
+          <a:xfrm>
+            <a:off x="6086691" y="2724267"/>
+            <a:ext cx="365760" cy="203105"/>
+          </a:xfrm>
+          <a:prstGeom prst="rightArrow">
+            <a:avLst/>
+          </a:prstGeom>
+          <a:solidFill>
+            <a:schemeClr val="bg1">
+              <a:lumMod val="85000"/>
+            </a:schemeClr>
+          </a:solidFill>
+          <a:ln w="12700" cmpd="sng">
+            <a:solidFill>
+              <a:schemeClr val="tx1"/>
+            </a:solidFill>
+          </a:ln>
+          <a:effectLst/>
+        </p:spPr>
+        <p:style>
+          <a:lnRef idx="1">
+            <a:schemeClr val="accent1"/>
+          </a:lnRef>
+          <a:fillRef idx="3">
+            <a:schemeClr val="accent1"/>
+          </a:fillRef>
+          <a:effectRef idx="2">
+            <a:schemeClr val="accent1"/>
+          </a:effectRef>
+          <a:fontRef idx="minor">
+            <a:schemeClr val="lt1"/>
+          </a:fontRef>
+        </p:style>
+        <p:txBody>
+          <a:bodyPr rtlCol="0" anchor="ctr"/>
+          <a:lstStyle/>
+          <a:p>
+            <a:pPr algn="ctr"/>
+            <a:endParaRPr lang="en-US" spc="-20"/>
+          </a:p>
+        </p:txBody>
+      </p:sp>
+    </p:spTree>
+    <p:extLst>
+      <p:ext uri="{BB962C8B-B14F-4D97-AF65-F5344CB8AC3E}">
+        <p14:creationId xmlns:p14="http://schemas.microsoft.com/office/powerpoint/2010/main" val="2764963919"/>
+      </p:ext>
+    </p:extLst>
+  </p:cSld>
+  <p:clrMapOvr>
+    <a:masterClrMapping/>
+  </p:clrMapOvr>
+</p:sld>
+</file>
+
+<file path=ppt/slides/slide4.xml><?xml version="1.0" encoding="utf-8"?>
 <p:sld xmlns:a="http://schemas.openxmlformats.org/drawingml/2006/main" xmlns:r="http://schemas.openxmlformats.org/officeDocument/2006/relationships" xmlns:p="http://schemas.openxmlformats.org/presentationml/2006/main">
   <p:cSld>
     <p:spTree>

</xml_diff>